<commit_message>
Committed for Azure Fundamentals
</commit_message>
<xml_diff>
--- a/Microsoft Azure.pptx
+++ b/Microsoft Azure.pptx
@@ -14,6 +14,9 @@
     <p:sldId id="262" r:id="rId8"/>
     <p:sldId id="263" r:id="rId9"/>
     <p:sldId id="264" r:id="rId10"/>
+    <p:sldId id="265" r:id="rId11"/>
+    <p:sldId id="266" r:id="rId12"/>
+    <p:sldId id="267" r:id="rId13"/>
   </p:sldIdLst>
   <p:sldSz cx="12192000" cy="6858000"/>
   <p:notesSz cx="6858000" cy="9144000"/>
@@ -123,7 +126,7 @@
 <file path=ppt/revisionInfo.xml><?xml version="1.0" encoding="utf-8"?>
 <p1510:revInfo xmlns:a="http://schemas.openxmlformats.org/drawingml/2006/main" xmlns:r="http://schemas.openxmlformats.org/officeDocument/2006/relationships" xmlns:p1510="http://schemas.microsoft.com/office/powerpoint/2015/10/main">
   <p1510:revLst>
-    <p1510:client id="{09058436-930E-45E3-B794-D1BC776E3724}" v="8" dt="2023-11-06T16:01:09.734"/>
+    <p1510:client id="{09058436-930E-45E3-B794-D1BC776E3724}" v="12" dt="2023-11-06T17:05:44.155"/>
   </p1510:revLst>
 </p1510:revInfo>
 </file>
@@ -132,8 +135,8 @@
 <pc:chgInfo xmlns:a="http://schemas.openxmlformats.org/drawingml/2006/main" xmlns:r="http://schemas.openxmlformats.org/officeDocument/2006/relationships" xmlns:ac="http://schemas.microsoft.com/office/drawing/2013/main/command" xmlns:pc="http://schemas.microsoft.com/office/powerpoint/2013/main/command">
   <pc:docChgLst>
     <pc:chgData name="Manaswini Ray" userId="451f23f8-43b4-4daa-9511-0c9fb98bad1c" providerId="ADAL" clId="{09058436-930E-45E3-B794-D1BC776E3724}"/>
-    <pc:docChg chg="undo custSel addSld modSld modMainMaster">
-      <pc:chgData name="Manaswini Ray" userId="451f23f8-43b4-4daa-9511-0c9fb98bad1c" providerId="ADAL" clId="{09058436-930E-45E3-B794-D1BC776E3724}" dt="2023-11-06T16:18:19.105" v="741" actId="1076"/>
+    <pc:docChg chg="undo custSel addSld delSld modSld modMainMaster">
+      <pc:chgData name="Manaswini Ray" userId="451f23f8-43b4-4daa-9511-0c9fb98bad1c" providerId="ADAL" clId="{09058436-930E-45E3-B794-D1BC776E3724}" dt="2023-11-06T17:12:44.138" v="978" actId="5793"/>
       <pc:docMkLst>
         <pc:docMk/>
       </pc:docMkLst>
@@ -145,13 +148,13 @@
         </pc:sldMkLst>
       </pc:sldChg>
       <pc:sldChg chg="addSp modSp mod modTransition">
-        <pc:chgData name="Manaswini Ray" userId="451f23f8-43b4-4daa-9511-0c9fb98bad1c" providerId="ADAL" clId="{09058436-930E-45E3-B794-D1BC776E3724}" dt="2023-11-06T13:51:59.314" v="396" actId="20577"/>
+        <pc:chgData name="Manaswini Ray" userId="451f23f8-43b4-4daa-9511-0c9fb98bad1c" providerId="ADAL" clId="{09058436-930E-45E3-B794-D1BC776E3724}" dt="2023-11-06T17:10:18.746" v="946" actId="207"/>
         <pc:sldMkLst>
           <pc:docMk/>
           <pc:sldMk cId="809094172" sldId="257"/>
         </pc:sldMkLst>
         <pc:spChg chg="add mod">
-          <ac:chgData name="Manaswini Ray" userId="451f23f8-43b4-4daa-9511-0c9fb98bad1c" providerId="ADAL" clId="{09058436-930E-45E3-B794-D1BC776E3724}" dt="2023-11-06T13:51:59.314" v="396" actId="20577"/>
+          <ac:chgData name="Manaswini Ray" userId="451f23f8-43b4-4daa-9511-0c9fb98bad1c" providerId="ADAL" clId="{09058436-930E-45E3-B794-D1BC776E3724}" dt="2023-11-06T17:10:18.746" v="946" actId="207"/>
           <ac:spMkLst>
             <pc:docMk/>
             <pc:sldMk cId="809094172" sldId="257"/>
@@ -198,13 +201,13 @@
         </pc:spChg>
       </pc:sldChg>
       <pc:sldChg chg="addSp modSp new mod modTransition">
-        <pc:chgData name="Manaswini Ray" userId="451f23f8-43b4-4daa-9511-0c9fb98bad1c" providerId="ADAL" clId="{09058436-930E-45E3-B794-D1BC776E3724}" dt="2023-11-06T13:51:38.491" v="391" actId="20577"/>
+        <pc:chgData name="Manaswini Ray" userId="451f23f8-43b4-4daa-9511-0c9fb98bad1c" providerId="ADAL" clId="{09058436-930E-45E3-B794-D1BC776E3724}" dt="2023-11-06T17:10:05.350" v="945" actId="207"/>
         <pc:sldMkLst>
           <pc:docMk/>
           <pc:sldMk cId="2535982024" sldId="260"/>
         </pc:sldMkLst>
         <pc:spChg chg="add mod">
-          <ac:chgData name="Manaswini Ray" userId="451f23f8-43b4-4daa-9511-0c9fb98bad1c" providerId="ADAL" clId="{09058436-930E-45E3-B794-D1BC776E3724}" dt="2023-11-06T13:51:38.491" v="391" actId="20577"/>
+          <ac:chgData name="Manaswini Ray" userId="451f23f8-43b4-4daa-9511-0c9fb98bad1c" providerId="ADAL" clId="{09058436-930E-45E3-B794-D1BC776E3724}" dt="2023-11-06T17:10:05.350" v="945" actId="207"/>
           <ac:spMkLst>
             <pc:docMk/>
             <pc:sldMk cId="2535982024" sldId="260"/>
@@ -213,13 +216,13 @@
         </pc:spChg>
       </pc:sldChg>
       <pc:sldChg chg="addSp modSp new mod">
-        <pc:chgData name="Manaswini Ray" userId="451f23f8-43b4-4daa-9511-0c9fb98bad1c" providerId="ADAL" clId="{09058436-930E-45E3-B794-D1BC776E3724}" dt="2023-11-06T14:06:19.585" v="487" actId="115"/>
+        <pc:chgData name="Manaswini Ray" userId="451f23f8-43b4-4daa-9511-0c9fb98bad1c" providerId="ADAL" clId="{09058436-930E-45E3-B794-D1BC776E3724}" dt="2023-11-06T17:09:45.597" v="941" actId="207"/>
         <pc:sldMkLst>
           <pc:docMk/>
           <pc:sldMk cId="2620181118" sldId="261"/>
         </pc:sldMkLst>
         <pc:spChg chg="add mod">
-          <ac:chgData name="Manaswini Ray" userId="451f23f8-43b4-4daa-9511-0c9fb98bad1c" providerId="ADAL" clId="{09058436-930E-45E3-B794-D1BC776E3724}" dt="2023-11-06T14:06:19.585" v="487" actId="115"/>
+          <ac:chgData name="Manaswini Ray" userId="451f23f8-43b4-4daa-9511-0c9fb98bad1c" providerId="ADAL" clId="{09058436-930E-45E3-B794-D1BC776E3724}" dt="2023-11-06T17:09:45.597" v="941" actId="207"/>
           <ac:spMkLst>
             <pc:docMk/>
             <pc:sldMk cId="2620181118" sldId="261"/>
@@ -228,13 +231,13 @@
         </pc:spChg>
       </pc:sldChg>
       <pc:sldChg chg="addSp modSp new mod">
-        <pc:chgData name="Manaswini Ray" userId="451f23f8-43b4-4daa-9511-0c9fb98bad1c" providerId="ADAL" clId="{09058436-930E-45E3-B794-D1BC776E3724}" dt="2023-11-06T14:06:02.819" v="485" actId="5793"/>
+        <pc:chgData name="Manaswini Ray" userId="451f23f8-43b4-4daa-9511-0c9fb98bad1c" providerId="ADAL" clId="{09058436-930E-45E3-B794-D1BC776E3724}" dt="2023-11-06T17:09:54.199" v="943" actId="207"/>
         <pc:sldMkLst>
           <pc:docMk/>
           <pc:sldMk cId="2022443549" sldId="262"/>
         </pc:sldMkLst>
         <pc:spChg chg="add mod">
-          <ac:chgData name="Manaswini Ray" userId="451f23f8-43b4-4daa-9511-0c9fb98bad1c" providerId="ADAL" clId="{09058436-930E-45E3-B794-D1BC776E3724}" dt="2023-11-06T14:06:02.819" v="485" actId="5793"/>
+          <ac:chgData name="Manaswini Ray" userId="451f23f8-43b4-4daa-9511-0c9fb98bad1c" providerId="ADAL" clId="{09058436-930E-45E3-B794-D1BC776E3724}" dt="2023-11-06T17:09:54.199" v="943" actId="207"/>
           <ac:spMkLst>
             <pc:docMk/>
             <pc:sldMk cId="2022443549" sldId="262"/>
@@ -243,13 +246,13 @@
         </pc:spChg>
       </pc:sldChg>
       <pc:sldChg chg="addSp modSp new mod">
-        <pc:chgData name="Manaswini Ray" userId="451f23f8-43b4-4daa-9511-0c9fb98bad1c" providerId="ADAL" clId="{09058436-930E-45E3-B794-D1BC776E3724}" dt="2023-11-06T16:00:58.771" v="564" actId="255"/>
+        <pc:chgData name="Manaswini Ray" userId="451f23f8-43b4-4daa-9511-0c9fb98bad1c" providerId="ADAL" clId="{09058436-930E-45E3-B794-D1BC776E3724}" dt="2023-11-06T17:09:38.243" v="940" actId="207"/>
         <pc:sldMkLst>
           <pc:docMk/>
           <pc:sldMk cId="2505085302" sldId="263"/>
         </pc:sldMkLst>
         <pc:spChg chg="add mod">
-          <ac:chgData name="Manaswini Ray" userId="451f23f8-43b4-4daa-9511-0c9fb98bad1c" providerId="ADAL" clId="{09058436-930E-45E3-B794-D1BC776E3724}" dt="2023-11-06T16:00:58.771" v="564" actId="255"/>
+          <ac:chgData name="Manaswini Ray" userId="451f23f8-43b4-4daa-9511-0c9fb98bad1c" providerId="ADAL" clId="{09058436-930E-45E3-B794-D1BC776E3724}" dt="2023-11-06T17:09:38.243" v="940" actId="207"/>
           <ac:spMkLst>
             <pc:docMk/>
             <pc:sldMk cId="2505085302" sldId="263"/>
@@ -258,17 +261,77 @@
         </pc:spChg>
       </pc:sldChg>
       <pc:sldChg chg="addSp modSp new mod">
-        <pc:chgData name="Manaswini Ray" userId="451f23f8-43b4-4daa-9511-0c9fb98bad1c" providerId="ADAL" clId="{09058436-930E-45E3-B794-D1BC776E3724}" dt="2023-11-06T16:18:19.105" v="741" actId="1076"/>
+        <pc:chgData name="Manaswini Ray" userId="451f23f8-43b4-4daa-9511-0c9fb98bad1c" providerId="ADAL" clId="{09058436-930E-45E3-B794-D1BC776E3724}" dt="2023-11-06T17:09:21.313" v="937" actId="207"/>
         <pc:sldMkLst>
           <pc:docMk/>
           <pc:sldMk cId="3516769679" sldId="264"/>
         </pc:sldMkLst>
         <pc:spChg chg="add mod">
-          <ac:chgData name="Manaswini Ray" userId="451f23f8-43b4-4daa-9511-0c9fb98bad1c" providerId="ADAL" clId="{09058436-930E-45E3-B794-D1BC776E3724}" dt="2023-11-06T16:18:19.105" v="741" actId="1076"/>
+          <ac:chgData name="Manaswini Ray" userId="451f23f8-43b4-4daa-9511-0c9fb98bad1c" providerId="ADAL" clId="{09058436-930E-45E3-B794-D1BC776E3724}" dt="2023-11-06T17:09:21.313" v="937" actId="207"/>
           <ac:spMkLst>
             <pc:docMk/>
             <pc:sldMk cId="3516769679" sldId="264"/>
             <ac:spMk id="2" creationId="{90795F24-946C-C77E-B75C-816093162D2C}"/>
+          </ac:spMkLst>
+        </pc:spChg>
+      </pc:sldChg>
+      <pc:sldChg chg="addSp modSp new mod">
+        <pc:chgData name="Manaswini Ray" userId="451f23f8-43b4-4daa-9511-0c9fb98bad1c" providerId="ADAL" clId="{09058436-930E-45E3-B794-D1BC776E3724}" dt="2023-11-06T17:09:07.438" v="934" actId="207"/>
+        <pc:sldMkLst>
+          <pc:docMk/>
+          <pc:sldMk cId="2768215198" sldId="265"/>
+        </pc:sldMkLst>
+        <pc:spChg chg="add mod">
+          <ac:chgData name="Manaswini Ray" userId="451f23f8-43b4-4daa-9511-0c9fb98bad1c" providerId="ADAL" clId="{09058436-930E-45E3-B794-D1BC776E3724}" dt="2023-11-06T17:09:07.438" v="934" actId="207"/>
+          <ac:spMkLst>
+            <pc:docMk/>
+            <pc:sldMk cId="2768215198" sldId="265"/>
+            <ac:spMk id="2" creationId="{0706893C-4462-2CF6-92AC-FD73888CBE5A}"/>
+          </ac:spMkLst>
+        </pc:spChg>
+      </pc:sldChg>
+      <pc:sldChg chg="addSp delSp modSp new mod">
+        <pc:chgData name="Manaswini Ray" userId="451f23f8-43b4-4daa-9511-0c9fb98bad1c" providerId="ADAL" clId="{09058436-930E-45E3-B794-D1BC776E3724}" dt="2023-11-06T17:09:02.233" v="933" actId="207"/>
+        <pc:sldMkLst>
+          <pc:docMk/>
+          <pc:sldMk cId="463092285" sldId="266"/>
+        </pc:sldMkLst>
+        <pc:spChg chg="add del mod">
+          <ac:chgData name="Manaswini Ray" userId="451f23f8-43b4-4daa-9511-0c9fb98bad1c" providerId="ADAL" clId="{09058436-930E-45E3-B794-D1BC776E3724}" dt="2023-11-06T17:00:21.969" v="838"/>
+          <ac:spMkLst>
+            <pc:docMk/>
+            <pc:sldMk cId="463092285" sldId="266"/>
+            <ac:spMk id="2" creationId="{C8C5FE8F-66EA-C427-8430-36AB6A1B80E9}"/>
+          </ac:spMkLst>
+        </pc:spChg>
+        <pc:spChg chg="add mod">
+          <ac:chgData name="Manaswini Ray" userId="451f23f8-43b4-4daa-9511-0c9fb98bad1c" providerId="ADAL" clId="{09058436-930E-45E3-B794-D1BC776E3724}" dt="2023-11-06T17:09:02.233" v="933" actId="207"/>
+          <ac:spMkLst>
+            <pc:docMk/>
+            <pc:sldMk cId="463092285" sldId="266"/>
+            <ac:spMk id="3" creationId="{BC67CE54-A301-FA6B-148A-C9C72B51E80F}"/>
+          </ac:spMkLst>
+        </pc:spChg>
+      </pc:sldChg>
+      <pc:sldChg chg="new del">
+        <pc:chgData name="Manaswini Ray" userId="451f23f8-43b4-4daa-9511-0c9fb98bad1c" providerId="ADAL" clId="{09058436-930E-45E3-B794-D1BC776E3724}" dt="2023-11-06T17:00:27.897" v="839" actId="2696"/>
+        <pc:sldMkLst>
+          <pc:docMk/>
+          <pc:sldMk cId="3843615232" sldId="267"/>
+        </pc:sldMkLst>
+      </pc:sldChg>
+      <pc:sldChg chg="addSp modSp new mod">
+        <pc:chgData name="Manaswini Ray" userId="451f23f8-43b4-4daa-9511-0c9fb98bad1c" providerId="ADAL" clId="{09058436-930E-45E3-B794-D1BC776E3724}" dt="2023-11-06T17:12:44.138" v="978" actId="5793"/>
+        <pc:sldMkLst>
+          <pc:docMk/>
+          <pc:sldMk cId="3998792257" sldId="267"/>
+        </pc:sldMkLst>
+        <pc:spChg chg="add mod">
+          <ac:chgData name="Manaswini Ray" userId="451f23f8-43b4-4daa-9511-0c9fb98bad1c" providerId="ADAL" clId="{09058436-930E-45E3-B794-D1BC776E3724}" dt="2023-11-06T17:12:44.138" v="978" actId="5793"/>
+          <ac:spMkLst>
+            <pc:docMk/>
+            <pc:sldMk cId="3998792257" sldId="267"/>
+            <ac:spMk id="2" creationId="{881B617B-B615-9CB2-C5C3-E082468EC8C7}"/>
           </ac:spMkLst>
         </pc:spChg>
       </pc:sldChg>
@@ -3735,6 +3798,1469 @@
 </p:sld>
 </file>
 
+<file path=ppt/slides/slide10.xml><?xml version="1.0" encoding="utf-8"?>
+<p:sld xmlns:a="http://schemas.openxmlformats.org/drawingml/2006/main" xmlns:r="http://schemas.openxmlformats.org/officeDocument/2006/relationships" xmlns:p="http://schemas.openxmlformats.org/presentationml/2006/main">
+  <p:cSld>
+    <p:spTree>
+      <p:nvGrpSpPr>
+        <p:cNvPr id="1" name=""/>
+        <p:cNvGrpSpPr/>
+        <p:nvPr/>
+      </p:nvGrpSpPr>
+      <p:grpSpPr>
+        <a:xfrm>
+          <a:off x="0" y="0"/>
+          <a:ext cx="0" cy="0"/>
+          <a:chOff x="0" y="0"/>
+          <a:chExt cx="0" cy="0"/>
+        </a:xfrm>
+      </p:grpSpPr>
+      <p:sp>
+        <p:nvSpPr>
+          <p:cNvPr id="2" name="TextBox 1">
+            <a:extLst>
+              <a:ext uri="{FF2B5EF4-FFF2-40B4-BE49-F238E27FC236}">
+                <a16:creationId xmlns:a16="http://schemas.microsoft.com/office/drawing/2014/main" id="{0706893C-4462-2CF6-92AC-FD73888CBE5A}"/>
+              </a:ext>
+            </a:extLst>
+          </p:cNvPr>
+          <p:cNvSpPr txBox="1"/>
+          <p:nvPr/>
+        </p:nvSpPr>
+        <p:spPr>
+          <a:xfrm>
+            <a:off x="372862" y="381740"/>
+            <a:ext cx="11327907" cy="6063198"/>
+          </a:xfrm>
+          <a:prstGeom prst="rect">
+            <a:avLst/>
+          </a:prstGeom>
+          <a:noFill/>
+        </p:spPr>
+        <p:txBody>
+          <a:bodyPr wrap="square" rtlCol="0">
+            <a:spAutoFit/>
+          </a:bodyPr>
+          <a:lstStyle/>
+          <a:p>
+            <a:r>
+              <a:rPr lang="en-US" sz="2500" u="sng" dirty="0"/>
+              <a:t>Azure </a:t>
+            </a:r>
+            <a:r>
+              <a:rPr lang="en-US" sz="2500" u="sng" dirty="0" err="1"/>
+              <a:t>Kubernets</a:t>
+            </a:r>
+            <a:r>
+              <a:rPr lang="en-US" sz="2500" u="sng" dirty="0"/>
+              <a:t> Services</a:t>
+            </a:r>
+          </a:p>
+          <a:p>
+            <a:endParaRPr lang="en-US" sz="2500" u="sng" dirty="0"/>
+          </a:p>
+          <a:p>
+            <a:pPr marL="342900" indent="-342900">
+              <a:buFont typeface="Arial" panose="020B0604020202020204" pitchFamily="34" charset="0"/>
+              <a:buChar char="•"/>
+            </a:pPr>
+            <a:r>
+              <a:rPr lang="en-US" sz="1600" b="0" i="0" dirty="0">
+                <a:solidFill>
+                  <a:srgbClr val="2A3B4F"/>
+                </a:solidFill>
+                <a:effectLst/>
+                <a:latin typeface="Lato" panose="020B0604020202020204" pitchFamily="34" charset="0"/>
+              </a:rPr>
+              <a:t>AKS is an open-source fully managed container orchestration service that became available in June 2018 and is available on the Microsoft Azure public cloud that can be used to deploy, scale and manage Docker containers and container-based applications in a cluster environment.</a:t>
+            </a:r>
+          </a:p>
+          <a:p>
+            <a:pPr marL="342900" indent="-342900">
+              <a:buFont typeface="Arial" panose="020B0604020202020204" pitchFamily="34" charset="0"/>
+              <a:buChar char="•"/>
+            </a:pPr>
+            <a:r>
+              <a:rPr lang="en-US" sz="1600" b="0" i="0" dirty="0">
+                <a:solidFill>
+                  <a:srgbClr val="2A3B4F"/>
+                </a:solidFill>
+                <a:effectLst/>
+                <a:latin typeface="Lato" panose="020F0502020204030203" pitchFamily="34" charset="0"/>
+              </a:rPr>
+              <a:t>Azure Kubernetes Service is a robust and cost-effective container orchestration service that helps you to deploy and manage containerized applications in seconds where additional resources are assigned automatically without the headache of managing additional servers.</a:t>
+            </a:r>
+          </a:p>
+          <a:p>
+            <a:endParaRPr lang="en-US" sz="1600" b="0" i="0" dirty="0">
+              <a:solidFill>
+                <a:srgbClr val="2A3B4F"/>
+              </a:solidFill>
+              <a:effectLst/>
+              <a:latin typeface="Lato" panose="020F0502020204030203" pitchFamily="34" charset="0"/>
+            </a:endParaRPr>
+          </a:p>
+          <a:p>
+            <a:pPr marL="342900" indent="-342900">
+              <a:buFont typeface="Arial" panose="020B0604020202020204" pitchFamily="34" charset="0"/>
+              <a:buChar char="•"/>
+            </a:pPr>
+            <a:r>
+              <a:rPr lang="en-US" sz="1600" dirty="0">
+                <a:solidFill>
+                  <a:srgbClr val="610B4B"/>
+                </a:solidFill>
+                <a:latin typeface="Lato" panose="020F0502020204030203" pitchFamily="34" charset="0"/>
+              </a:rPr>
+              <a:t>Benefits:</a:t>
+            </a:r>
+          </a:p>
+          <a:p>
+            <a:pPr marL="857250" lvl="1" indent="-400050">
+              <a:buFont typeface="+mj-lt"/>
+              <a:buAutoNum type="romanLcPeriod"/>
+            </a:pPr>
+            <a:r>
+              <a:rPr lang="en-US" sz="1600" b="1" i="0" dirty="0">
+                <a:solidFill>
+                  <a:srgbClr val="2A3B4F"/>
+                </a:solidFill>
+                <a:effectLst/>
+                <a:latin typeface="Lato" panose="020F0502020204030203" pitchFamily="34" charset="0"/>
+              </a:rPr>
+              <a:t>Efficient resource utilization:</a:t>
+            </a:r>
+            <a:r>
+              <a:rPr lang="en-US" sz="1600" b="0" i="0" dirty="0">
+                <a:solidFill>
+                  <a:srgbClr val="2A3B4F"/>
+                </a:solidFill>
+                <a:effectLst/>
+                <a:latin typeface="Lato" panose="020F0502020204030203" pitchFamily="34" charset="0"/>
+              </a:rPr>
+              <a:t> The fully managed AKS offers easy deployment and management of containerized applications with efficient resource utilization that elastically provisions additional resources without the headache of managing the Kubernetes infrastructure.</a:t>
+            </a:r>
+          </a:p>
+          <a:p>
+            <a:pPr marL="857250" lvl="1" indent="-400050">
+              <a:buFont typeface="+mj-lt"/>
+              <a:buAutoNum type="romanLcPeriod"/>
+            </a:pPr>
+            <a:r>
+              <a:rPr lang="en-IN" sz="1600" b="1" i="0" dirty="0">
+                <a:solidFill>
+                  <a:srgbClr val="2A3B4F"/>
+                </a:solidFill>
+                <a:effectLst/>
+                <a:latin typeface="Lato" panose="020F0502020204030203" pitchFamily="34" charset="0"/>
+              </a:rPr>
+              <a:t>Faster application development:</a:t>
+            </a:r>
+            <a:r>
+              <a:rPr lang="en-IN" sz="1600" b="0" i="0" dirty="0">
+                <a:solidFill>
+                  <a:srgbClr val="2A3B4F"/>
+                </a:solidFill>
+                <a:effectLst/>
+                <a:latin typeface="Lato" panose="020F0502020204030203" pitchFamily="34" charset="0"/>
+              </a:rPr>
+              <a:t> </a:t>
+            </a:r>
+            <a:r>
+              <a:rPr lang="en-US" sz="1600" b="0" i="0" dirty="0">
+                <a:solidFill>
+                  <a:srgbClr val="2A3B4F"/>
+                </a:solidFill>
+                <a:effectLst/>
+                <a:latin typeface="Lato" panose="020F0502020204030203" pitchFamily="34" charset="0"/>
+              </a:rPr>
+              <a:t>AKS reduces the debugging time while handling patching, auto-upgrades, and self-healing and simplifies the container orchestration. </a:t>
+            </a:r>
+            <a:endParaRPr lang="en-US" sz="1600" dirty="0">
+              <a:solidFill>
+                <a:srgbClr val="2A3B4F"/>
+              </a:solidFill>
+              <a:latin typeface="Lato" panose="020F0502020204030203" pitchFamily="34" charset="0"/>
+            </a:endParaRPr>
+          </a:p>
+          <a:p>
+            <a:pPr marL="857250" lvl="1" indent="-400050">
+              <a:buFont typeface="+mj-lt"/>
+              <a:buAutoNum type="romanLcPeriod"/>
+            </a:pPr>
+            <a:r>
+              <a:rPr lang="en-IN" sz="1600" b="1" i="0" dirty="0">
+                <a:solidFill>
+                  <a:srgbClr val="2A3B4F"/>
+                </a:solidFill>
+                <a:effectLst/>
+                <a:latin typeface="Lato" panose="020F0502020204030203" pitchFamily="34" charset="0"/>
+              </a:rPr>
+              <a:t>Security and compliance:</a:t>
+            </a:r>
+            <a:r>
+              <a:rPr lang="en-US" sz="1600" b="0" i="0" u="none" strike="noStrike" dirty="0">
+                <a:solidFill>
+                  <a:srgbClr val="005EEC"/>
+                </a:solidFill>
+                <a:effectLst/>
+                <a:latin typeface="Lato" panose="020F0502020204030203" pitchFamily="34" charset="0"/>
+                <a:hlinkClick r:id="rId2"/>
+              </a:rPr>
+              <a:t>AKS integrates with Azure Active Directory (AD)</a:t>
+            </a:r>
+            <a:r>
+              <a:rPr lang="en-US" sz="1600" b="0" i="0" dirty="0">
+                <a:solidFill>
+                  <a:srgbClr val="2A3B4F"/>
+                </a:solidFill>
+                <a:effectLst/>
+                <a:latin typeface="Lato" panose="020F0502020204030203" pitchFamily="34" charset="0"/>
+              </a:rPr>
+              <a:t> and offers on-demand access to the users to greatly reduce threats and risks. AKS is also completely compliant with the standards and regulatory requirements such as System and Organization Controls (SOC), HIPAA, ISO, and PCI DSS.</a:t>
+            </a:r>
+          </a:p>
+          <a:p>
+            <a:pPr marL="857250" lvl="1" indent="-400050">
+              <a:buFont typeface="+mj-lt"/>
+              <a:buAutoNum type="romanLcPeriod"/>
+            </a:pPr>
+            <a:r>
+              <a:rPr lang="en-US" sz="1600" b="1" i="0" dirty="0">
+                <a:solidFill>
+                  <a:srgbClr val="2A3B4F"/>
+                </a:solidFill>
+                <a:effectLst/>
+                <a:latin typeface="Lato" panose="020F0502020204030203" pitchFamily="34" charset="0"/>
+              </a:rPr>
+              <a:t>Quicker development and integration: </a:t>
+            </a:r>
+            <a:r>
+              <a:rPr lang="en-US" sz="1600" b="0" i="0" dirty="0">
+                <a:solidFill>
+                  <a:srgbClr val="2A3B4F"/>
+                </a:solidFill>
+                <a:effectLst/>
+                <a:latin typeface="Lato" panose="020F0502020204030203" pitchFamily="34" charset="0"/>
+              </a:rPr>
+              <a:t>Azure Kubernetes Service (AKS) supports auto-upgrades, monitoring, and scaling and helps in minimizing the infrastructure maintenance that leads to comparatively faster development and integration.</a:t>
+            </a:r>
+          </a:p>
+          <a:p>
+            <a:pPr lvl="1"/>
+            <a:endParaRPr lang="en-US" sz="1600" dirty="0"/>
+          </a:p>
+          <a:p>
+            <a:endParaRPr lang="en-IN" u="sng" dirty="0"/>
+          </a:p>
+        </p:txBody>
+      </p:sp>
+    </p:spTree>
+    <p:extLst>
+      <p:ext uri="{BB962C8B-B14F-4D97-AF65-F5344CB8AC3E}">
+        <p14:creationId xmlns:p14="http://schemas.microsoft.com/office/powerpoint/2010/main" val="2768215198"/>
+      </p:ext>
+    </p:extLst>
+  </p:cSld>
+  <p:clrMapOvr>
+    <a:masterClrMapping/>
+  </p:clrMapOvr>
+</p:sld>
+</file>
+
+<file path=ppt/slides/slide11.xml><?xml version="1.0" encoding="utf-8"?>
+<p:sld xmlns:a="http://schemas.openxmlformats.org/drawingml/2006/main" xmlns:r="http://schemas.openxmlformats.org/officeDocument/2006/relationships" xmlns:p="http://schemas.openxmlformats.org/presentationml/2006/main">
+  <p:cSld>
+    <p:spTree>
+      <p:nvGrpSpPr>
+        <p:cNvPr id="1" name=""/>
+        <p:cNvGrpSpPr/>
+        <p:nvPr/>
+      </p:nvGrpSpPr>
+      <p:grpSpPr>
+        <a:xfrm>
+          <a:off x="0" y="0"/>
+          <a:ext cx="0" cy="0"/>
+          <a:chOff x="0" y="0"/>
+          <a:chExt cx="0" cy="0"/>
+        </a:xfrm>
+      </p:grpSpPr>
+      <p:sp>
+        <p:nvSpPr>
+          <p:cNvPr id="3" name="TextBox 2">
+            <a:extLst>
+              <a:ext uri="{FF2B5EF4-FFF2-40B4-BE49-F238E27FC236}">
+                <a16:creationId xmlns:a16="http://schemas.microsoft.com/office/drawing/2014/main" id="{BC67CE54-A301-FA6B-148A-C9C72B51E80F}"/>
+              </a:ext>
+            </a:extLst>
+          </p:cNvPr>
+          <p:cNvSpPr txBox="1"/>
+          <p:nvPr/>
+        </p:nvSpPr>
+        <p:spPr>
+          <a:xfrm>
+            <a:off x="204187" y="0"/>
+            <a:ext cx="11656381" cy="7786747"/>
+          </a:xfrm>
+          <a:prstGeom prst="rect">
+            <a:avLst/>
+          </a:prstGeom>
+          <a:noFill/>
+        </p:spPr>
+        <p:txBody>
+          <a:bodyPr wrap="square" rtlCol="0">
+            <a:spAutoFit/>
+          </a:bodyPr>
+          <a:lstStyle/>
+          <a:p>
+            <a:pPr marL="342900" indent="-342900">
+              <a:buFont typeface="Arial" panose="020B0604020202020204" pitchFamily="34" charset="0"/>
+              <a:buChar char="•"/>
+            </a:pPr>
+            <a:r>
+              <a:rPr lang="en-IN" sz="2000" b="0" i="0" dirty="0">
+                <a:solidFill>
+                  <a:srgbClr val="610B4B"/>
+                </a:solidFill>
+                <a:effectLst/>
+                <a:latin typeface="erdana"/>
+              </a:rPr>
+              <a:t>Key Objects of Kubernetes:</a:t>
+            </a:r>
+          </a:p>
+          <a:p>
+            <a:pPr marL="514350" indent="-514350" algn="just">
+              <a:buFont typeface="+mj-lt"/>
+              <a:buAutoNum type="romanLcPeriod"/>
+            </a:pPr>
+            <a:r>
+              <a:rPr lang="en-IN" sz="1600" b="1" i="0" dirty="0">
+                <a:solidFill>
+                  <a:srgbClr val="333333"/>
+                </a:solidFill>
+                <a:effectLst/>
+                <a:latin typeface="inter-bold"/>
+              </a:rPr>
+              <a:t>Pod</a:t>
+            </a:r>
+            <a:r>
+              <a:rPr lang="en-IN" sz="1600" dirty="0">
+                <a:solidFill>
+                  <a:srgbClr val="333333"/>
+                </a:solidFill>
+                <a:latin typeface="erdana"/>
+              </a:rPr>
+              <a:t>:</a:t>
+            </a:r>
+            <a:r>
+              <a:rPr lang="en-US" sz="1600" b="0" i="0" dirty="0">
+                <a:solidFill>
+                  <a:srgbClr val="333333"/>
+                </a:solidFill>
+                <a:effectLst/>
+                <a:latin typeface="inter-regular"/>
+              </a:rPr>
+              <a:t>It is the smallest and simplest basic unit of the Kubernetes application. This object indicates the processes which are running in the cluster.</a:t>
+            </a:r>
+          </a:p>
+          <a:p>
+            <a:pPr marL="514350" indent="-514350" algn="just">
+              <a:buFont typeface="+mj-lt"/>
+              <a:buAutoNum type="romanLcPeriod"/>
+            </a:pPr>
+            <a:r>
+              <a:rPr lang="en-US" sz="1600" b="1" i="0" dirty="0">
+                <a:solidFill>
+                  <a:srgbClr val="333333"/>
+                </a:solidFill>
+                <a:effectLst/>
+                <a:latin typeface="inter-bold"/>
+              </a:rPr>
+              <a:t>Node:</a:t>
+            </a:r>
+            <a:r>
+              <a:rPr lang="en-US" sz="1600" dirty="0">
+                <a:solidFill>
+                  <a:srgbClr val="333333"/>
+                </a:solidFill>
+                <a:latin typeface="inter-regular"/>
+              </a:rPr>
+              <a:t> </a:t>
+            </a:r>
+            <a:r>
+              <a:rPr lang="en-US" sz="1600" b="0" i="0" dirty="0">
+                <a:solidFill>
+                  <a:srgbClr val="333333"/>
+                </a:solidFill>
+                <a:effectLst/>
+                <a:latin typeface="inter-regular"/>
+              </a:rPr>
+              <a:t>A </a:t>
+            </a:r>
+            <a:r>
+              <a:rPr lang="en-US" sz="1600" b="1" i="0" dirty="0">
+                <a:solidFill>
+                  <a:srgbClr val="333333"/>
+                </a:solidFill>
+                <a:effectLst/>
+                <a:latin typeface="inter-bold"/>
+              </a:rPr>
+              <a:t>node</a:t>
+            </a:r>
+            <a:r>
+              <a:rPr lang="en-US" sz="1600" b="0" i="0" dirty="0">
+                <a:solidFill>
+                  <a:srgbClr val="333333"/>
+                </a:solidFill>
+                <a:effectLst/>
+                <a:latin typeface="inter-regular"/>
+              </a:rPr>
+              <a:t> is nothing but a single host, which is used to run the virtual or physical machines. A node in the Kubernetes cluster is also known as a minion.</a:t>
+            </a:r>
+          </a:p>
+          <a:p>
+            <a:pPr marL="514350" indent="-514350" algn="just">
+              <a:buFont typeface="+mj-lt"/>
+              <a:buAutoNum type="romanLcPeriod"/>
+            </a:pPr>
+            <a:r>
+              <a:rPr lang="en-US" sz="1600" b="1" i="0" dirty="0">
+                <a:solidFill>
+                  <a:srgbClr val="333333"/>
+                </a:solidFill>
+                <a:effectLst/>
+                <a:latin typeface="inter-bold"/>
+              </a:rPr>
+              <a:t>Service</a:t>
+            </a:r>
+            <a:r>
+              <a:rPr lang="en-US" sz="1600" dirty="0">
+                <a:solidFill>
+                  <a:srgbClr val="333333"/>
+                </a:solidFill>
+                <a:latin typeface="inter-regular"/>
+              </a:rPr>
+              <a:t>: </a:t>
+            </a:r>
+            <a:r>
+              <a:rPr lang="en-US" sz="1600" b="0" i="0" dirty="0">
+                <a:solidFill>
+                  <a:srgbClr val="333333"/>
+                </a:solidFill>
+                <a:effectLst/>
+                <a:latin typeface="inter-regular"/>
+              </a:rPr>
+              <a:t>A </a:t>
+            </a:r>
+            <a:r>
+              <a:rPr lang="en-US" sz="1600" b="1" i="0" dirty="0">
+                <a:solidFill>
+                  <a:srgbClr val="333333"/>
+                </a:solidFill>
+                <a:effectLst/>
+                <a:latin typeface="inter-bold"/>
+              </a:rPr>
+              <a:t>service</a:t>
+            </a:r>
+            <a:r>
+              <a:rPr lang="en-US" sz="1600" b="0" i="0" dirty="0">
+                <a:solidFill>
+                  <a:srgbClr val="333333"/>
+                </a:solidFill>
+                <a:effectLst/>
+                <a:latin typeface="inter-regular"/>
+              </a:rPr>
+              <a:t> in a Kubernetes is a logical set of pods, which works together. With the help of services, users can easily manage load balancing configurations.</a:t>
+            </a:r>
+          </a:p>
+          <a:p>
+            <a:pPr marL="514350" indent="-514350" algn="just">
+              <a:buFont typeface="+mj-lt"/>
+              <a:buAutoNum type="romanLcPeriod"/>
+            </a:pPr>
+            <a:r>
+              <a:rPr lang="en-US" sz="1600" b="1" i="0" dirty="0" err="1">
+                <a:solidFill>
+                  <a:srgbClr val="333333"/>
+                </a:solidFill>
+                <a:effectLst/>
+                <a:latin typeface="inter-bold"/>
+              </a:rPr>
+              <a:t>ReplicaSet</a:t>
+            </a:r>
+            <a:r>
+              <a:rPr lang="en-US" sz="1600" b="1" dirty="0">
+                <a:solidFill>
+                  <a:srgbClr val="333333"/>
+                </a:solidFill>
+                <a:latin typeface="inter-bold"/>
+              </a:rPr>
+              <a:t>: </a:t>
+            </a:r>
+            <a:r>
+              <a:rPr lang="en-US" sz="1600" b="0" i="0" dirty="0">
+                <a:solidFill>
+                  <a:srgbClr val="333333"/>
+                </a:solidFill>
+                <a:effectLst/>
+                <a:latin typeface="inter-regular"/>
+              </a:rPr>
+              <a:t>A </a:t>
+            </a:r>
+            <a:r>
+              <a:rPr lang="en-US" sz="1600" b="1" i="0" dirty="0" err="1">
+                <a:solidFill>
+                  <a:srgbClr val="333333"/>
+                </a:solidFill>
+                <a:effectLst/>
+                <a:latin typeface="inter-bold"/>
+              </a:rPr>
+              <a:t>ReplicaSet</a:t>
+            </a:r>
+            <a:r>
+              <a:rPr lang="en-US" sz="1600" b="0" i="0" dirty="0">
+                <a:solidFill>
+                  <a:srgbClr val="333333"/>
+                </a:solidFill>
+                <a:effectLst/>
+                <a:latin typeface="inter-regular"/>
+              </a:rPr>
+              <a:t> in the Kubernetes is used to identify the particular number of pod replicas are running at a given time. It replaces the replication controller because it is more powerful and allows a user to use the "set-based" label selector.</a:t>
+            </a:r>
+          </a:p>
+          <a:p>
+            <a:pPr marL="514350" indent="-514350" algn="just">
+              <a:buFont typeface="+mj-lt"/>
+              <a:buAutoNum type="romanLcPeriod"/>
+            </a:pPr>
+            <a:r>
+              <a:rPr lang="en-US" sz="1600" b="1" i="0" dirty="0">
+                <a:solidFill>
+                  <a:srgbClr val="333333"/>
+                </a:solidFill>
+                <a:effectLst/>
+                <a:latin typeface="inter-bold"/>
+              </a:rPr>
+              <a:t>Namespace</a:t>
+            </a:r>
+            <a:r>
+              <a:rPr lang="en-US" sz="1600" dirty="0">
+                <a:solidFill>
+                  <a:srgbClr val="333333"/>
+                </a:solidFill>
+                <a:latin typeface="inter-regular"/>
+              </a:rPr>
+              <a:t>: </a:t>
+            </a:r>
+            <a:r>
+              <a:rPr lang="en-US" sz="1600" b="1" i="0" dirty="0">
+                <a:solidFill>
+                  <a:srgbClr val="333333"/>
+                </a:solidFill>
+                <a:effectLst/>
+                <a:latin typeface="inter-bold"/>
+              </a:rPr>
+              <a:t>Kubernetes</a:t>
+            </a:r>
+            <a:r>
+              <a:rPr lang="en-US" sz="1600" b="0" i="0" dirty="0">
+                <a:solidFill>
+                  <a:srgbClr val="333333"/>
+                </a:solidFill>
+                <a:effectLst/>
+                <a:latin typeface="inter-regular"/>
+              </a:rPr>
+              <a:t> supports various virtual clusters, which are known as namespaces. It is a way of dividing the cluster resources between two or more users.</a:t>
+            </a:r>
+          </a:p>
+          <a:p>
+            <a:pPr marL="971550" lvl="1" indent="-514350" algn="just">
+              <a:buFont typeface="+mj-lt"/>
+              <a:buAutoNum type="romanLcPeriod"/>
+            </a:pPr>
+            <a:endParaRPr lang="en-US" sz="1000" b="0" i="0" dirty="0">
+              <a:solidFill>
+                <a:srgbClr val="333333"/>
+              </a:solidFill>
+              <a:effectLst/>
+              <a:latin typeface="inter-regular"/>
+            </a:endParaRPr>
+          </a:p>
+          <a:p>
+            <a:pPr marL="342900" indent="-342900">
+              <a:buFont typeface="Arial" panose="020B0604020202020204" pitchFamily="34" charset="0"/>
+              <a:buChar char="•"/>
+            </a:pPr>
+            <a:r>
+              <a:rPr lang="en-IN" sz="2000" b="0" i="0" dirty="0">
+                <a:solidFill>
+                  <a:srgbClr val="610B4B"/>
+                </a:solidFill>
+                <a:effectLst/>
+                <a:latin typeface="erdana"/>
+              </a:rPr>
+              <a:t>Features of Kubernetes:</a:t>
+            </a:r>
+          </a:p>
+          <a:p>
+            <a:pPr marL="400050" indent="-400050" algn="just">
+              <a:buFont typeface="+mj-lt"/>
+              <a:buAutoNum type="romanLcPeriod"/>
+            </a:pPr>
+            <a:r>
+              <a:rPr lang="en-US" sz="1600" b="1" i="0" dirty="0">
+                <a:solidFill>
+                  <a:srgbClr val="000000"/>
+                </a:solidFill>
+                <a:effectLst/>
+                <a:latin typeface="inter-bold"/>
+              </a:rPr>
+              <a:t>Pod:</a:t>
+            </a:r>
+            <a:r>
+              <a:rPr lang="en-US" sz="1600" b="0" i="0" dirty="0">
+                <a:solidFill>
+                  <a:srgbClr val="000000"/>
+                </a:solidFill>
+                <a:effectLst/>
+                <a:latin typeface="inter-regular"/>
+              </a:rPr>
+              <a:t> It is a deployment unit in Kubernetes with a single Internet protocol address.</a:t>
+            </a:r>
+          </a:p>
+          <a:p>
+            <a:pPr marL="400050" indent="-400050" algn="just">
+              <a:buFont typeface="+mj-lt"/>
+              <a:buAutoNum type="romanLcPeriod"/>
+            </a:pPr>
+            <a:r>
+              <a:rPr lang="en-US" sz="1600" b="1" i="0" dirty="0">
+                <a:solidFill>
+                  <a:srgbClr val="000000"/>
+                </a:solidFill>
+                <a:effectLst/>
+                <a:latin typeface="inter-bold"/>
+              </a:rPr>
+              <a:t>Horizontal Scaling:</a:t>
+            </a:r>
+            <a:r>
+              <a:rPr lang="en-US" sz="1600" b="0" i="0" dirty="0">
+                <a:solidFill>
+                  <a:srgbClr val="000000"/>
+                </a:solidFill>
+                <a:effectLst/>
+                <a:latin typeface="inter-regular"/>
+              </a:rPr>
+              <a:t> This feature uses a </a:t>
+            </a:r>
+            <a:r>
+              <a:rPr lang="en-US" sz="1600" b="1" i="0" dirty="0" err="1">
+                <a:solidFill>
+                  <a:srgbClr val="000000"/>
+                </a:solidFill>
+                <a:effectLst/>
+                <a:latin typeface="inter-bold"/>
+              </a:rPr>
+              <a:t>HorizontalPodAutoscalar</a:t>
+            </a:r>
+            <a:r>
+              <a:rPr lang="en-US" sz="1600" b="0" i="0" dirty="0">
+                <a:solidFill>
+                  <a:srgbClr val="000000"/>
+                </a:solidFill>
+                <a:effectLst/>
+                <a:latin typeface="inter-regular"/>
+              </a:rPr>
+              <a:t> to automatically increase or decrease the number of pods in a deployment, replication controller, replica set, or stateful set on the basis of observed CPU utilization.</a:t>
+            </a:r>
+          </a:p>
+          <a:p>
+            <a:pPr marL="400050" indent="-400050" algn="just">
+              <a:buFont typeface="+mj-lt"/>
+              <a:buAutoNum type="romanLcPeriod"/>
+            </a:pPr>
+            <a:r>
+              <a:rPr lang="en-US" sz="1600" b="1" i="0" dirty="0">
+                <a:solidFill>
+                  <a:srgbClr val="000000"/>
+                </a:solidFill>
+                <a:effectLst/>
+                <a:latin typeface="inter-bold"/>
+              </a:rPr>
+              <a:t>Automatic Bin Packing:</a:t>
+            </a:r>
+            <a:r>
+              <a:rPr lang="en-US" sz="1600" b="0" i="0" dirty="0">
+                <a:solidFill>
+                  <a:srgbClr val="000000"/>
+                </a:solidFill>
+                <a:effectLst/>
+                <a:latin typeface="inter-regular"/>
+              </a:rPr>
+              <a:t> Kubernetes helps the user to declare the maximum and minimum resources of computers for their containers.</a:t>
+            </a:r>
+          </a:p>
+          <a:p>
+            <a:pPr marL="400050" indent="-400050" algn="just">
+              <a:buFont typeface="+mj-lt"/>
+              <a:buAutoNum type="romanLcPeriod"/>
+            </a:pPr>
+            <a:r>
+              <a:rPr lang="en-US" sz="1600" b="1" i="0" dirty="0">
+                <a:solidFill>
+                  <a:srgbClr val="000000"/>
+                </a:solidFill>
+                <a:effectLst/>
+                <a:latin typeface="inter-bold"/>
+              </a:rPr>
+              <a:t>Service Discovery and load balancing:</a:t>
+            </a:r>
+            <a:r>
+              <a:rPr lang="en-US" sz="1600" b="0" i="0" dirty="0">
+                <a:solidFill>
+                  <a:srgbClr val="000000"/>
+                </a:solidFill>
+                <a:effectLst/>
+                <a:latin typeface="inter-regular"/>
+              </a:rPr>
+              <a:t> Kubernetes assigns the IP addresses and a Name of DNS for a set of containers, and also balances the load across them.</a:t>
+            </a:r>
+          </a:p>
+          <a:p>
+            <a:pPr marL="400050" indent="-400050" algn="just">
+              <a:buFont typeface="+mj-lt"/>
+              <a:buAutoNum type="romanLcPeriod"/>
+            </a:pPr>
+            <a:r>
+              <a:rPr lang="en-US" sz="1600" b="1" i="0" dirty="0">
+                <a:solidFill>
+                  <a:srgbClr val="000000"/>
+                </a:solidFill>
+                <a:effectLst/>
+                <a:latin typeface="inter-bold"/>
+              </a:rPr>
+              <a:t>Automated rollouts and rollbacks:</a:t>
+            </a:r>
+            <a:r>
+              <a:rPr lang="en-US" sz="1600" b="0" i="0" dirty="0">
+                <a:solidFill>
+                  <a:srgbClr val="000000"/>
+                </a:solidFill>
+                <a:effectLst/>
+                <a:latin typeface="inter-regular"/>
+              </a:rPr>
+              <a:t> Using the rollouts, Kubernetes distributes the changes and updates to an application or its configuration. If any problem occurs in the system, then this technique rollbacks those changes for you immediately.</a:t>
+            </a:r>
+          </a:p>
+          <a:p>
+            <a:pPr marL="400050" indent="-400050" algn="just">
+              <a:buFont typeface="+mj-lt"/>
+              <a:buAutoNum type="romanLcPeriod"/>
+            </a:pPr>
+            <a:r>
+              <a:rPr lang="en-US" sz="1600" b="1" i="0" dirty="0">
+                <a:solidFill>
+                  <a:srgbClr val="000000"/>
+                </a:solidFill>
+                <a:effectLst/>
+                <a:latin typeface="inter-bold"/>
+              </a:rPr>
+              <a:t>Persistent Storage:</a:t>
+            </a:r>
+            <a:r>
+              <a:rPr lang="en-US" sz="1600" b="0" i="0" dirty="0">
+                <a:solidFill>
+                  <a:srgbClr val="000000"/>
+                </a:solidFill>
+                <a:effectLst/>
+                <a:latin typeface="inter-regular"/>
+              </a:rPr>
+              <a:t> Kubernetes provides an essential feature called '</a:t>
+            </a:r>
+            <a:r>
+              <a:rPr lang="en-US" sz="1600" b="1" i="0" dirty="0">
+                <a:solidFill>
+                  <a:srgbClr val="000000"/>
+                </a:solidFill>
+                <a:effectLst/>
+                <a:latin typeface="inter-bold"/>
+              </a:rPr>
+              <a:t>persistent storage'</a:t>
+            </a:r>
+            <a:r>
+              <a:rPr lang="en-US" sz="1600" b="0" i="0" dirty="0">
+                <a:solidFill>
+                  <a:srgbClr val="000000"/>
+                </a:solidFill>
+                <a:effectLst/>
+                <a:latin typeface="inter-regular"/>
+              </a:rPr>
+              <a:t> for storing the data, which cannot be lost after the pod is killed or rescheduled. Kubernetes supports various storage systems for storing the data, such as </a:t>
+            </a:r>
+            <a:r>
+              <a:rPr lang="en-US" sz="1600" b="1" i="0" dirty="0">
+                <a:solidFill>
+                  <a:srgbClr val="000000"/>
+                </a:solidFill>
+                <a:effectLst/>
+                <a:latin typeface="inter-bold"/>
+              </a:rPr>
+              <a:t>Google Compute Engine's Persistent Disks (GCE PD) or Amazon Elastic Block Storage (EBS).</a:t>
+            </a:r>
+            <a:r>
+              <a:rPr lang="en-US" sz="1600" b="0" i="0" dirty="0">
+                <a:solidFill>
+                  <a:srgbClr val="000000"/>
+                </a:solidFill>
+                <a:effectLst/>
+                <a:latin typeface="inter-regular"/>
+              </a:rPr>
+              <a:t> It also provides the distributed file systems: </a:t>
+            </a:r>
+            <a:r>
+              <a:rPr lang="en-US" sz="1600" b="1" i="0" dirty="0">
+                <a:solidFill>
+                  <a:srgbClr val="000000"/>
+                </a:solidFill>
+                <a:effectLst/>
+                <a:latin typeface="inter-bold"/>
+              </a:rPr>
+              <a:t>NFS or GFS</a:t>
+            </a:r>
+            <a:r>
+              <a:rPr lang="en-US" sz="1600" b="0" i="0" dirty="0">
+                <a:solidFill>
+                  <a:srgbClr val="000000"/>
+                </a:solidFill>
+                <a:effectLst/>
+                <a:latin typeface="inter-regular"/>
+              </a:rPr>
+              <a:t>.</a:t>
+            </a:r>
+          </a:p>
+          <a:p>
+            <a:pPr marL="400050" indent="-400050" algn="just">
+              <a:buFont typeface="+mj-lt"/>
+              <a:buAutoNum type="romanLcPeriod"/>
+            </a:pPr>
+            <a:r>
+              <a:rPr lang="en-US" sz="1600" b="1" i="0" dirty="0">
+                <a:solidFill>
+                  <a:srgbClr val="000000"/>
+                </a:solidFill>
+                <a:effectLst/>
+                <a:latin typeface="inter-bold"/>
+              </a:rPr>
+              <a:t>Self-Healing:</a:t>
+            </a:r>
+            <a:r>
+              <a:rPr lang="en-US" sz="1600" b="0" i="0" dirty="0">
+                <a:solidFill>
+                  <a:srgbClr val="000000"/>
+                </a:solidFill>
+                <a:effectLst/>
+                <a:latin typeface="inter-regular"/>
+              </a:rPr>
+              <a:t> This feature plays an important role in the concept of Kubernetes. Those containers which are failed during the execution process, Kubernetes restarts them automatically. And those containers which do not reply to the user-defined health check, it stops them from working automatically.</a:t>
+            </a:r>
+          </a:p>
+          <a:p>
+            <a:pPr marL="342900" indent="-342900">
+              <a:buFont typeface="Arial" panose="020B0604020202020204" pitchFamily="34" charset="0"/>
+              <a:buChar char="•"/>
+            </a:pPr>
+            <a:endParaRPr lang="en-IN" sz="1600" b="0" i="0" dirty="0">
+              <a:effectLst/>
+              <a:latin typeface="erdana"/>
+            </a:endParaRPr>
+          </a:p>
+          <a:p>
+            <a:pPr marL="971550" lvl="1" indent="-514350">
+              <a:buFont typeface="+mj-lt"/>
+              <a:buAutoNum type="romanLcPeriod"/>
+            </a:pPr>
+            <a:endParaRPr lang="en-IN" sz="1600" b="0" i="0" dirty="0">
+              <a:effectLst/>
+              <a:latin typeface="erdana"/>
+            </a:endParaRPr>
+          </a:p>
+          <a:p>
+            <a:pPr marL="342900" indent="-342900">
+              <a:buFont typeface="Arial" panose="020B0604020202020204" pitchFamily="34" charset="0"/>
+              <a:buChar char="•"/>
+            </a:pPr>
+            <a:endParaRPr lang="en-IN" sz="1600" b="0" i="0" dirty="0">
+              <a:effectLst/>
+              <a:latin typeface="erdana"/>
+            </a:endParaRPr>
+          </a:p>
+          <a:p>
+            <a:endParaRPr lang="en-IN" dirty="0"/>
+          </a:p>
+        </p:txBody>
+      </p:sp>
+    </p:spTree>
+    <p:extLst>
+      <p:ext uri="{BB962C8B-B14F-4D97-AF65-F5344CB8AC3E}">
+        <p14:creationId xmlns:p14="http://schemas.microsoft.com/office/powerpoint/2010/main" val="463092285"/>
+      </p:ext>
+    </p:extLst>
+  </p:cSld>
+  <p:clrMapOvr>
+    <a:masterClrMapping/>
+  </p:clrMapOvr>
+</p:sld>
+</file>
+
+<file path=ppt/slides/slide12.xml><?xml version="1.0" encoding="utf-8"?>
+<p:sld xmlns:a="http://schemas.openxmlformats.org/drawingml/2006/main" xmlns:r="http://schemas.openxmlformats.org/officeDocument/2006/relationships" xmlns:p="http://schemas.openxmlformats.org/presentationml/2006/main">
+  <p:cSld>
+    <p:spTree>
+      <p:nvGrpSpPr>
+        <p:cNvPr id="1" name=""/>
+        <p:cNvGrpSpPr/>
+        <p:nvPr/>
+      </p:nvGrpSpPr>
+      <p:grpSpPr>
+        <a:xfrm>
+          <a:off x="0" y="0"/>
+          <a:ext cx="0" cy="0"/>
+          <a:chOff x="0" y="0"/>
+          <a:chExt cx="0" cy="0"/>
+        </a:xfrm>
+      </p:grpSpPr>
+      <p:sp>
+        <p:nvSpPr>
+          <p:cNvPr id="2" name="TextBox 1">
+            <a:extLst>
+              <a:ext uri="{FF2B5EF4-FFF2-40B4-BE49-F238E27FC236}">
+                <a16:creationId xmlns:a16="http://schemas.microsoft.com/office/drawing/2014/main" id="{881B617B-B615-9CB2-C5C3-E082468EC8C7}"/>
+              </a:ext>
+            </a:extLst>
+          </p:cNvPr>
+          <p:cNvSpPr txBox="1"/>
+          <p:nvPr/>
+        </p:nvSpPr>
+        <p:spPr>
+          <a:xfrm>
+            <a:off x="258932" y="204186"/>
+            <a:ext cx="11674136" cy="7232749"/>
+          </a:xfrm>
+          <a:prstGeom prst="rect">
+            <a:avLst/>
+          </a:prstGeom>
+          <a:noFill/>
+        </p:spPr>
+        <p:txBody>
+          <a:bodyPr wrap="square" rtlCol="0">
+            <a:spAutoFit/>
+          </a:bodyPr>
+          <a:lstStyle/>
+          <a:p>
+            <a:pPr algn="just"/>
+            <a:r>
+              <a:rPr lang="en-IN" sz="2000" b="0" i="0" dirty="0">
+                <a:effectLst/>
+                <a:latin typeface="erdana"/>
+              </a:rPr>
+              <a:t>Kubernetes Architecture</a:t>
+            </a:r>
+          </a:p>
+          <a:p>
+            <a:pPr marL="342900" indent="-342900" algn="just">
+              <a:buFont typeface="Arial" panose="020B0604020202020204" pitchFamily="34" charset="0"/>
+              <a:buChar char="•"/>
+            </a:pPr>
+            <a:r>
+              <a:rPr lang="en-IN" sz="2000" b="0" i="0" dirty="0">
+                <a:solidFill>
+                  <a:srgbClr val="610B4B"/>
+                </a:solidFill>
+                <a:effectLst/>
+                <a:latin typeface="erdana"/>
+              </a:rPr>
+              <a:t>Master Node or Kubernetes Control Plane</a:t>
+            </a:r>
+          </a:p>
+          <a:p>
+            <a:pPr algn="just"/>
+            <a:r>
+              <a:rPr lang="en-US" sz="1600" b="0" i="0" dirty="0">
+                <a:solidFill>
+                  <a:srgbClr val="333333"/>
+                </a:solidFill>
+                <a:effectLst/>
+                <a:latin typeface="inter-regular"/>
+              </a:rPr>
+              <a:t>The master node in a Kubernetes architecture is used to manage the states of a cluster. It is actually an entry point for all types of administrative tasks. In the Kubernetes cluster, more than one master node is present for checking the fault tolerance.</a:t>
+            </a:r>
+            <a:endParaRPr lang="en-IN" sz="1600" b="0" i="0" dirty="0">
+              <a:solidFill>
+                <a:srgbClr val="610B4B"/>
+              </a:solidFill>
+              <a:effectLst/>
+              <a:latin typeface="erdana"/>
+            </a:endParaRPr>
+          </a:p>
+          <a:p>
+            <a:pPr marL="400050" indent="-400050" algn="just">
+              <a:buFont typeface="+mj-lt"/>
+              <a:buAutoNum type="romanLcPeriod"/>
+            </a:pPr>
+            <a:r>
+              <a:rPr lang="en-US" sz="1600" b="1" i="0" dirty="0">
+                <a:solidFill>
+                  <a:srgbClr val="333333"/>
+                </a:solidFill>
+                <a:effectLst/>
+                <a:latin typeface="inter-bold"/>
+              </a:rPr>
+              <a:t>API Server</a:t>
+            </a:r>
+            <a:r>
+              <a:rPr lang="en-US" sz="1600" dirty="0">
+                <a:solidFill>
+                  <a:srgbClr val="333333"/>
+                </a:solidFill>
+                <a:latin typeface="inter-regular"/>
+              </a:rPr>
+              <a:t>: </a:t>
+            </a:r>
+            <a:r>
+              <a:rPr lang="en-US" sz="1600" b="0" i="0" dirty="0">
+                <a:solidFill>
+                  <a:srgbClr val="333333"/>
+                </a:solidFill>
+                <a:effectLst/>
+                <a:latin typeface="inter-regular"/>
+              </a:rPr>
+              <a:t>The Kubernetes API server receives the REST commands which are sent by the user. After receiving, it validates the REST requests, process, and then executes them. After the execution of REST commands, the resulting state of a cluster is saved in '</a:t>
+            </a:r>
+            <a:r>
+              <a:rPr lang="en-US" sz="1600" b="1" i="0" dirty="0" err="1">
+                <a:solidFill>
+                  <a:srgbClr val="333333"/>
+                </a:solidFill>
+                <a:effectLst/>
+                <a:latin typeface="inter-bold"/>
+              </a:rPr>
+              <a:t>etcd</a:t>
+            </a:r>
+            <a:r>
+              <a:rPr lang="en-US" sz="1600" b="0" i="0" dirty="0">
+                <a:solidFill>
+                  <a:srgbClr val="333333"/>
+                </a:solidFill>
+                <a:effectLst/>
+                <a:latin typeface="inter-regular"/>
+              </a:rPr>
+              <a:t>' as a distributed key-value store.</a:t>
+            </a:r>
+          </a:p>
+          <a:p>
+            <a:pPr marL="400050" indent="-400050" algn="just">
+              <a:buFont typeface="+mj-lt"/>
+              <a:buAutoNum type="romanLcPeriod"/>
+            </a:pPr>
+            <a:r>
+              <a:rPr lang="en-IN" sz="1600" b="1" i="0" dirty="0">
+                <a:solidFill>
+                  <a:srgbClr val="333333"/>
+                </a:solidFill>
+                <a:effectLst/>
+                <a:latin typeface="inter-bold"/>
+              </a:rPr>
+              <a:t>Scheduler</a:t>
+            </a:r>
+            <a:r>
+              <a:rPr lang="en-US" sz="1600" dirty="0">
+                <a:solidFill>
+                  <a:srgbClr val="333333"/>
+                </a:solidFill>
+                <a:latin typeface="inter-regular"/>
+              </a:rPr>
+              <a:t>: </a:t>
+            </a:r>
+            <a:r>
+              <a:rPr lang="en-US" sz="1600" b="0" i="0" dirty="0">
+                <a:solidFill>
+                  <a:srgbClr val="333333"/>
+                </a:solidFill>
+                <a:effectLst/>
+                <a:latin typeface="inter-regular"/>
+              </a:rPr>
+              <a:t>it is a process that is responsible for assigning pods to the available worker nodes.</a:t>
+            </a:r>
+            <a:endParaRPr lang="en-US" sz="1600" dirty="0">
+              <a:solidFill>
+                <a:srgbClr val="333333"/>
+              </a:solidFill>
+              <a:latin typeface="inter-regular"/>
+            </a:endParaRPr>
+          </a:p>
+          <a:p>
+            <a:pPr marL="400050" indent="-400050" algn="just">
+              <a:buFont typeface="+mj-lt"/>
+              <a:buAutoNum type="romanLcPeriod"/>
+            </a:pPr>
+            <a:r>
+              <a:rPr lang="en-IN" sz="1600" b="1" i="0" dirty="0">
+                <a:solidFill>
+                  <a:srgbClr val="333333"/>
+                </a:solidFill>
+                <a:effectLst/>
+                <a:latin typeface="inter-bold"/>
+              </a:rPr>
+              <a:t>Controller Manager</a:t>
+            </a:r>
+            <a:r>
+              <a:rPr lang="en-US" sz="1600" b="1" i="0" dirty="0">
+                <a:solidFill>
+                  <a:srgbClr val="333333"/>
+                </a:solidFill>
+                <a:effectLst/>
+                <a:latin typeface="inter-regular"/>
+              </a:rPr>
+              <a:t>: </a:t>
+            </a:r>
+            <a:r>
+              <a:rPr lang="en-US" sz="1600" b="0" i="0" dirty="0">
+                <a:solidFill>
+                  <a:srgbClr val="333333"/>
+                </a:solidFill>
+                <a:effectLst/>
+                <a:latin typeface="inter-regular"/>
+              </a:rPr>
+              <a:t>It is a daemon that executes in the non-terminating control loops. The controllers in a master node perform a task and manage the state of the cluster.</a:t>
+            </a:r>
+          </a:p>
+          <a:p>
+            <a:pPr marL="400050" indent="-400050" algn="just">
+              <a:buFont typeface="+mj-lt"/>
+              <a:buAutoNum type="romanLcPeriod"/>
+            </a:pPr>
+            <a:r>
+              <a:rPr lang="en-US" sz="1600" b="1" i="0" dirty="0">
+                <a:solidFill>
+                  <a:srgbClr val="333333"/>
+                </a:solidFill>
+                <a:effectLst/>
+                <a:latin typeface="inter-bold"/>
+              </a:rPr>
+              <a:t>ETCD</a:t>
+            </a:r>
+            <a:endParaRPr lang="en-US" sz="1600" b="0" i="0" dirty="0">
+              <a:solidFill>
+                <a:srgbClr val="333333"/>
+              </a:solidFill>
+              <a:effectLst/>
+              <a:latin typeface="inter-regular"/>
+            </a:endParaRPr>
+          </a:p>
+          <a:p>
+            <a:pPr marL="400050" indent="-400050" algn="just">
+              <a:buFont typeface="+mj-lt"/>
+              <a:buAutoNum type="romanLcPeriod"/>
+            </a:pPr>
+            <a:r>
+              <a:rPr lang="en-US" sz="1600" b="0" i="0" dirty="0">
+                <a:solidFill>
+                  <a:srgbClr val="333333"/>
+                </a:solidFill>
+                <a:effectLst/>
+                <a:latin typeface="inter-regular"/>
+              </a:rPr>
+              <a:t>It is an open-source, simple, distributed key-value storage which is used to store the cluster data. It is a part of a master node which is written in a GO programming language.</a:t>
+            </a:r>
+          </a:p>
+          <a:p>
+            <a:pPr algn="just"/>
+            <a:endParaRPr lang="en-US" sz="1600" b="0" i="0" dirty="0">
+              <a:solidFill>
+                <a:srgbClr val="333333"/>
+              </a:solidFill>
+              <a:effectLst/>
+              <a:latin typeface="inter-regular"/>
+            </a:endParaRPr>
+          </a:p>
+          <a:p>
+            <a:pPr marL="285750" indent="-285750" algn="just">
+              <a:buFont typeface="Arial" panose="020B0604020202020204" pitchFamily="34" charset="0"/>
+              <a:buChar char="•"/>
+            </a:pPr>
+            <a:r>
+              <a:rPr lang="en-US" sz="2000" b="0" i="0" dirty="0">
+                <a:solidFill>
+                  <a:srgbClr val="610B4B"/>
+                </a:solidFill>
+                <a:effectLst/>
+                <a:latin typeface="erdana"/>
+              </a:rPr>
+              <a:t>Worker/Slave node</a:t>
+            </a:r>
+          </a:p>
+          <a:p>
+            <a:pPr algn="just"/>
+            <a:r>
+              <a:rPr lang="en-US" sz="1600" b="0" i="0" dirty="0">
+                <a:solidFill>
+                  <a:srgbClr val="333333"/>
+                </a:solidFill>
+                <a:effectLst/>
+                <a:latin typeface="inter-regular"/>
+              </a:rPr>
+              <a:t>The Worker node in a Kubernetes is also known as minions. A worker node is a physical machine that executes the applications using pods. It contains all the essential services which allow a user to assign the resources to the scheduled containers.</a:t>
+            </a:r>
+          </a:p>
+          <a:p>
+            <a:pPr marL="400050" indent="-400050" algn="just">
+              <a:buFont typeface="+mj-lt"/>
+              <a:buAutoNum type="romanLcPeriod"/>
+            </a:pPr>
+            <a:r>
+              <a:rPr lang="en-US" sz="1600" b="1" i="0" dirty="0" err="1">
+                <a:solidFill>
+                  <a:srgbClr val="333333"/>
+                </a:solidFill>
+                <a:effectLst/>
+                <a:latin typeface="inter-bold"/>
+              </a:rPr>
+              <a:t>Kubelet</a:t>
+            </a:r>
+            <a:r>
+              <a:rPr lang="en-US" sz="1600" dirty="0">
+                <a:solidFill>
+                  <a:srgbClr val="333333"/>
+                </a:solidFill>
+                <a:latin typeface="inter-regular"/>
+              </a:rPr>
+              <a:t>: </a:t>
+            </a:r>
+            <a:r>
+              <a:rPr lang="en-US" sz="1600" b="0" i="0" dirty="0">
+                <a:solidFill>
+                  <a:srgbClr val="333333"/>
+                </a:solidFill>
+                <a:effectLst/>
+                <a:latin typeface="inter-regular"/>
+              </a:rPr>
+              <a:t>This component is an agent service that executes on each worker node in a cluster. It ensures that the pods and their containers are running smoothly. Every </a:t>
+            </a:r>
+            <a:r>
+              <a:rPr lang="en-US" sz="1600" b="1" i="0" dirty="0" err="1">
+                <a:solidFill>
+                  <a:srgbClr val="333333"/>
+                </a:solidFill>
+                <a:effectLst/>
+                <a:latin typeface="inter-bold"/>
+              </a:rPr>
+              <a:t>kubelet</a:t>
+            </a:r>
+            <a:r>
+              <a:rPr lang="en-US" sz="1600" b="0" i="0" dirty="0">
+                <a:solidFill>
+                  <a:srgbClr val="333333"/>
+                </a:solidFill>
+                <a:effectLst/>
+                <a:latin typeface="inter-regular"/>
+              </a:rPr>
+              <a:t> in each worker node communicates with the master node. It also starts, stops, and maintains the containers which are organized into pods directly by the master node.</a:t>
+            </a:r>
+          </a:p>
+          <a:p>
+            <a:pPr marL="400050" indent="-400050" algn="just">
+              <a:buFont typeface="+mj-lt"/>
+              <a:buAutoNum type="romanLcPeriod"/>
+            </a:pPr>
+            <a:r>
+              <a:rPr lang="en-US" sz="1600" b="1" i="0" dirty="0" err="1">
+                <a:solidFill>
+                  <a:srgbClr val="333333"/>
+                </a:solidFill>
+                <a:effectLst/>
+                <a:latin typeface="inter-bold"/>
+              </a:rPr>
+              <a:t>Kube</a:t>
+            </a:r>
+            <a:r>
+              <a:rPr lang="en-US" sz="1600" b="1" i="0" dirty="0">
+                <a:solidFill>
+                  <a:srgbClr val="333333"/>
+                </a:solidFill>
+                <a:effectLst/>
+                <a:latin typeface="inter-bold"/>
+              </a:rPr>
+              <a:t>-proxy</a:t>
+            </a:r>
+            <a:r>
+              <a:rPr lang="en-US" sz="1600" dirty="0">
+                <a:solidFill>
+                  <a:srgbClr val="333333"/>
+                </a:solidFill>
+                <a:latin typeface="inter-regular"/>
+              </a:rPr>
+              <a:t>: </a:t>
+            </a:r>
+            <a:r>
+              <a:rPr lang="en-US" sz="1600" b="0" i="0" dirty="0">
+                <a:solidFill>
+                  <a:srgbClr val="333333"/>
+                </a:solidFill>
+                <a:effectLst/>
+                <a:latin typeface="inter-regular"/>
+              </a:rPr>
+              <a:t>It is a proxy service of Kubernetes, which is executed simply on each worker node in the cluster. The main aim of this component is request forwarding. Each node interacts with the Kubernetes services through </a:t>
+            </a:r>
+            <a:r>
+              <a:rPr lang="en-US" sz="1600" b="1" i="0" dirty="0" err="1">
+                <a:solidFill>
+                  <a:srgbClr val="333333"/>
+                </a:solidFill>
+                <a:effectLst/>
+                <a:latin typeface="inter-bold"/>
+              </a:rPr>
+              <a:t>Kube</a:t>
+            </a:r>
+            <a:r>
+              <a:rPr lang="en-US" sz="1600" b="1" i="0" dirty="0">
+                <a:solidFill>
+                  <a:srgbClr val="333333"/>
+                </a:solidFill>
+                <a:effectLst/>
+                <a:latin typeface="inter-bold"/>
+              </a:rPr>
+              <a:t>-proxy</a:t>
+            </a:r>
+            <a:r>
+              <a:rPr lang="en-US" sz="1600" b="0" i="0" dirty="0">
+                <a:solidFill>
+                  <a:srgbClr val="333333"/>
+                </a:solidFill>
+                <a:effectLst/>
+                <a:latin typeface="inter-regular"/>
+              </a:rPr>
+              <a:t>.</a:t>
+            </a:r>
+          </a:p>
+          <a:p>
+            <a:pPr marL="400050" indent="-400050" algn="just">
+              <a:buFont typeface="+mj-lt"/>
+              <a:buAutoNum type="romanLcPeriod"/>
+            </a:pPr>
+            <a:r>
+              <a:rPr lang="en-US" sz="1600" b="1" i="0" dirty="0">
+                <a:solidFill>
+                  <a:srgbClr val="333333"/>
+                </a:solidFill>
+                <a:effectLst/>
+                <a:latin typeface="inter-bold"/>
+              </a:rPr>
+              <a:t>Pods</a:t>
+            </a:r>
+            <a:r>
+              <a:rPr lang="en-US" sz="1600" dirty="0">
+                <a:solidFill>
+                  <a:srgbClr val="333333"/>
+                </a:solidFill>
+                <a:latin typeface="inter-regular"/>
+              </a:rPr>
+              <a:t>: </a:t>
+            </a:r>
+            <a:r>
+              <a:rPr lang="en-US" sz="1600" b="0" i="0" dirty="0">
+                <a:solidFill>
+                  <a:srgbClr val="333333"/>
+                </a:solidFill>
+                <a:effectLst/>
+                <a:latin typeface="inter-regular"/>
+              </a:rPr>
+              <a:t>A </a:t>
+            </a:r>
+            <a:r>
+              <a:rPr lang="en-US" sz="1600" b="1" i="0" dirty="0">
+                <a:solidFill>
+                  <a:srgbClr val="333333"/>
+                </a:solidFill>
+                <a:effectLst/>
+                <a:latin typeface="inter-bold"/>
+              </a:rPr>
+              <a:t>pod</a:t>
+            </a:r>
+            <a:r>
+              <a:rPr lang="en-US" sz="1600" b="0" i="0" dirty="0">
+                <a:solidFill>
+                  <a:srgbClr val="333333"/>
+                </a:solidFill>
+                <a:effectLst/>
+                <a:latin typeface="inter-regular"/>
+              </a:rPr>
+              <a:t> is a combination of one or more containers which logically execute together on nodes. One worker node can easily execute multiple pods.</a:t>
+            </a:r>
+          </a:p>
+          <a:p>
+            <a:pPr marL="400050" indent="-400050" algn="just">
+              <a:buFont typeface="+mj-lt"/>
+              <a:buAutoNum type="romanLcPeriod"/>
+            </a:pPr>
+            <a:endParaRPr lang="en-US" sz="1600" b="0" i="0" dirty="0">
+              <a:solidFill>
+                <a:srgbClr val="333333"/>
+              </a:solidFill>
+              <a:effectLst/>
+              <a:latin typeface="inter-regular"/>
+            </a:endParaRPr>
+          </a:p>
+          <a:p>
+            <a:pPr marL="285750" indent="-285750" algn="just">
+              <a:buFont typeface="Arial" panose="020B0604020202020204" pitchFamily="34" charset="0"/>
+              <a:buChar char="•"/>
+            </a:pPr>
+            <a:endParaRPr lang="en-US" sz="1600" b="0" i="0" dirty="0">
+              <a:solidFill>
+                <a:srgbClr val="333333"/>
+              </a:solidFill>
+              <a:effectLst/>
+              <a:latin typeface="inter-regular"/>
+            </a:endParaRPr>
+          </a:p>
+          <a:p>
+            <a:pPr marL="400050" indent="-400050" algn="just">
+              <a:buFont typeface="+mj-lt"/>
+              <a:buAutoNum type="romanLcPeriod"/>
+            </a:pPr>
+            <a:endParaRPr lang="en-US" sz="1600" b="0" i="0" dirty="0">
+              <a:solidFill>
+                <a:srgbClr val="333333"/>
+              </a:solidFill>
+              <a:effectLst/>
+              <a:latin typeface="inter-regular"/>
+            </a:endParaRPr>
+          </a:p>
+          <a:p>
+            <a:pPr marL="514350" indent="-514350" algn="just">
+              <a:buFont typeface="+mj-lt"/>
+              <a:buAutoNum type="romanLcPeriod"/>
+            </a:pPr>
+            <a:endParaRPr lang="en-IN" sz="2000" b="0" i="0" dirty="0">
+              <a:effectLst/>
+              <a:latin typeface="erdana"/>
+            </a:endParaRPr>
+          </a:p>
+        </p:txBody>
+      </p:sp>
+    </p:spTree>
+    <p:extLst>
+      <p:ext uri="{BB962C8B-B14F-4D97-AF65-F5344CB8AC3E}">
+        <p14:creationId xmlns:p14="http://schemas.microsoft.com/office/powerpoint/2010/main" val="3998792257"/>
+      </p:ext>
+    </p:extLst>
+  </p:cSld>
+  <p:clrMapOvr>
+    <a:masterClrMapping/>
+  </p:clrMapOvr>
+</p:sld>
+</file>
+
 <file path=ppt/slides/slide2.xml><?xml version="1.0" encoding="utf-8"?>
 <p:sld xmlns:a="http://schemas.openxmlformats.org/drawingml/2006/main" xmlns:r="http://schemas.openxmlformats.org/officeDocument/2006/relationships" xmlns:p="http://schemas.openxmlformats.org/presentationml/2006/main">
   <p:cSld>
@@ -3845,7 +5371,7 @@
             <a:r>
               <a:rPr lang="en-US" sz="1600" b="0" i="0" dirty="0">
                 <a:solidFill>
-                  <a:srgbClr val="323131"/>
+                  <a:srgbClr val="610B4B"/>
                 </a:solidFill>
                 <a:effectLst/>
                 <a:latin typeface="Google Sans"/>
@@ -4878,7 +6404,7 @@
             <a:r>
               <a:rPr lang="en-US" b="1" i="0" dirty="0">
                 <a:solidFill>
-                  <a:srgbClr val="101010"/>
+                  <a:srgbClr val="610B4B"/>
                 </a:solidFill>
                 <a:effectLst/>
                 <a:latin typeface="multi-display"/>
@@ -5056,7 +6582,7 @@
             <a:r>
               <a:rPr lang="en-IN" b="1" i="0" dirty="0">
                 <a:solidFill>
-                  <a:srgbClr val="101010"/>
+                  <a:srgbClr val="610B4B"/>
                 </a:solidFill>
                 <a:effectLst/>
                 <a:latin typeface="multi-display"/>
@@ -5337,7 +6863,7 @@
             <a:r>
               <a:rPr lang="en-US" b="0" i="0" dirty="0">
                 <a:solidFill>
-                  <a:srgbClr val="000000"/>
+                  <a:srgbClr val="610B4B"/>
                 </a:solidFill>
                 <a:effectLst/>
                 <a:latin typeface="multi-display"/>
@@ -5594,7 +7120,7 @@
             <a:r>
               <a:rPr lang="en-IN" b="1" i="0" dirty="0">
                 <a:solidFill>
-                  <a:srgbClr val="101010"/>
+                  <a:srgbClr val="610B4B"/>
                 </a:solidFill>
                 <a:effectLst/>
                 <a:latin typeface="multi-display"/>
@@ -5668,7 +7194,7 @@
             <a:r>
               <a:rPr lang="en-IN" b="1" i="0" dirty="0">
                 <a:solidFill>
-                  <a:srgbClr val="101010"/>
+                  <a:srgbClr val="610B4B"/>
                 </a:solidFill>
                 <a:effectLst/>
                 <a:latin typeface="multi-display"/>
@@ -6019,6 +7545,9 @@
             </a:pPr>
             <a:r>
               <a:rPr lang="en-US" sz="1600" b="0" i="0" dirty="0">
+                <a:solidFill>
+                  <a:srgbClr val="610B4B"/>
+                </a:solidFill>
                 <a:effectLst/>
                 <a:latin typeface="Arial" panose="020B0604020202020204" pitchFamily="34" charset="0"/>
               </a:rPr>
@@ -6026,6 +7555,9 @@
             </a:r>
             <a:r>
               <a:rPr lang="en-US" sz="1600" b="0" i="0" u="sng" dirty="0">
+                <a:solidFill>
+                  <a:srgbClr val="610B4B"/>
+                </a:solidFill>
                 <a:effectLst/>
                 <a:latin typeface="Arial" panose="020B0604020202020204" pitchFamily="34" charset="0"/>
                 <a:hlinkClick r:id="rId8">
@@ -6040,6 +7572,9 @@
             </a:r>
             <a:r>
               <a:rPr lang="en-US" sz="1600" b="0" i="0" dirty="0">
+                <a:solidFill>
+                  <a:srgbClr val="610B4B"/>
+                </a:solidFill>
                 <a:effectLst/>
                 <a:latin typeface="Arial" panose="020B0604020202020204" pitchFamily="34" charset="0"/>
               </a:rPr>
@@ -6137,12 +7672,18 @@
             </a:pPr>
             <a:r>
               <a:rPr lang="en-US" sz="1600" dirty="0">
+                <a:solidFill>
+                  <a:srgbClr val="610B4B"/>
+                </a:solidFill>
                 <a:latin typeface="Arial" panose="020B0604020202020204" pitchFamily="34" charset="0"/>
               </a:rPr>
               <a:t>T</a:t>
             </a:r>
             <a:r>
               <a:rPr lang="en-US" sz="1600" i="0" dirty="0">
+                <a:solidFill>
+                  <a:srgbClr val="610B4B"/>
+                </a:solidFill>
                 <a:effectLst/>
                 <a:latin typeface="Arial" panose="020B0604020202020204" pitchFamily="34" charset="0"/>
               </a:rPr>
@@ -6222,6 +7763,9 @@
             </a:pPr>
             <a:r>
               <a:rPr lang="en-US" sz="1600" b="0" i="0" dirty="0">
+                <a:solidFill>
+                  <a:srgbClr val="610B4B"/>
+                </a:solidFill>
                 <a:effectLst/>
                 <a:latin typeface="Arial" panose="020B0604020202020204" pitchFamily="34" charset="0"/>
               </a:rPr>
@@ -6448,7 +7992,7 @@
             <a:r>
               <a:rPr lang="en-US" sz="1600" b="0" i="0" dirty="0">
                 <a:solidFill>
-                  <a:srgbClr val="2F353E"/>
+                  <a:srgbClr val="610B4B"/>
                 </a:solidFill>
                 <a:effectLst/>
                 <a:latin typeface="Rubik"/>
@@ -6479,6 +8023,9 @@
             </a:pPr>
             <a:r>
               <a:rPr lang="en-IN" sz="1600" b="0" i="0" dirty="0">
+                <a:solidFill>
+                  <a:srgbClr val="610B4B"/>
+                </a:solidFill>
                 <a:effectLst/>
                 <a:latin typeface="erdana"/>
               </a:rPr>
@@ -6654,11 +8201,17 @@
             </a:pPr>
             <a:r>
               <a:rPr lang="en-US" sz="1600" dirty="0">
+                <a:solidFill>
+                  <a:srgbClr val="610B4B"/>
+                </a:solidFill>
                 <a:latin typeface="Rubik"/>
               </a:rPr>
               <a:t>Pricing</a:t>
             </a:r>
             <a:endParaRPr lang="en-US" sz="1600" b="0" i="0" dirty="0">
+              <a:solidFill>
+                <a:srgbClr val="610B4B"/>
+              </a:solidFill>
               <a:effectLst/>
               <a:latin typeface="Rubik"/>
             </a:endParaRPr>

</xml_diff>